<commit_message>
[UPD] Hip 16 /21 /22
</commit_message>
<xml_diff>
--- a/tweet_data/media/HIP/HIP16.pptx
+++ b/tweet_data/media/HIP/HIP16.pptx
@@ -214,7 +214,7 @@
           <a:p>
             <a:fld id="{762B48F5-BACC-47D6-A0F7-82FBF9C6BC85}" type="datetimeFigureOut">
               <a:rPr lang="en-US"/>
-              <a:t>8/18/2021</a:t>
+              <a:t>12/1/2021</a:t>
             </a:fld>
             <a:endParaRPr/>
           </a:p>
@@ -379,7 +379,7 @@
           <a:p>
             <a:fld id="{0CB1CD00-5424-4675-AB18-2C419B060449}" type="datetimeFigureOut">
               <a:rPr lang="en-US"/>
-              <a:t>8/18/2021</a:t>
+              <a:t>12/1/2021</a:t>
             </a:fld>
             <a:endParaRPr/>
           </a:p>
@@ -1016,7 +1016,7 @@
           <a:p>
             <a:fld id="{37CC0096-1860-4642-9CD2-0079EA5E7CD1}" type="datetimeFigureOut">
               <a:rPr lang="en-US" smtClean="0"/>
-              <a:t>8/18/2021</a:t>
+              <a:t>12/1/2021</a:t>
             </a:fld>
             <a:endParaRPr lang="en-US"/>
           </a:p>
@@ -1196,7 +1196,7 @@
           <a:p>
             <a:fld id="{37CC0096-1860-4642-9CD2-0079EA5E7CD1}" type="datetimeFigureOut">
               <a:rPr lang="en-US" smtClean="0"/>
-              <a:t>8/18/2021</a:t>
+              <a:t>12/1/2021</a:t>
             </a:fld>
             <a:endParaRPr lang="en-US"/>
           </a:p>
@@ -1370,7 +1370,7 @@
           <a:p>
             <a:fld id="{37CC0096-1860-4642-9CD2-0079EA5E7CD1}" type="datetimeFigureOut">
               <a:rPr lang="en-US" smtClean="0"/>
-              <a:t>8/18/2021</a:t>
+              <a:t>12/1/2021</a:t>
             </a:fld>
             <a:endParaRPr lang="en-US"/>
           </a:p>
@@ -1805,7 +1805,7 @@
           <a:p>
             <a:fld id="{37CC0096-1860-4642-9CD2-0079EA5E7CD1}" type="datetimeFigureOut">
               <a:rPr lang="en-US" smtClean="0"/>
-              <a:t>8/18/2021</a:t>
+              <a:t>12/1/2021</a:t>
             </a:fld>
             <a:endParaRPr lang="en-US"/>
           </a:p>
@@ -2245,7 +2245,7 @@
           <a:p>
             <a:fld id="{37CC0096-1860-4642-9CD2-0079EA5E7CD1}" type="datetimeFigureOut">
               <a:rPr lang="en-US" smtClean="0"/>
-              <a:t>8/18/2021</a:t>
+              <a:t>12/1/2021</a:t>
             </a:fld>
             <a:endParaRPr lang="en-US"/>
           </a:p>
@@ -2363,7 +2363,7 @@
           <a:p>
             <a:fld id="{37CC0096-1860-4642-9CD2-0079EA5E7CD1}" type="datetimeFigureOut">
               <a:rPr lang="en-US" smtClean="0"/>
-              <a:t>8/18/2021</a:t>
+              <a:t>12/1/2021</a:t>
             </a:fld>
             <a:endParaRPr lang="en-US"/>
           </a:p>
@@ -2458,7 +2458,7 @@
           <a:p>
             <a:fld id="{37CC0096-1860-4642-9CD2-0079EA5E7CD1}" type="datetimeFigureOut">
               <a:rPr lang="en-US" smtClean="0"/>
-              <a:t>8/18/2021</a:t>
+              <a:t>12/1/2021</a:t>
             </a:fld>
             <a:endParaRPr lang="en-US"/>
           </a:p>
@@ -2742,7 +2742,7 @@
           <a:p>
             <a:fld id="{37CC0096-1860-4642-9CD2-0079EA5E7CD1}" type="datetimeFigureOut">
               <a:rPr lang="en-US" smtClean="0"/>
-              <a:t>8/18/2021</a:t>
+              <a:t>12/1/2021</a:t>
             </a:fld>
             <a:endParaRPr lang="en-US"/>
           </a:p>
@@ -3055,7 +3055,7 @@
           <a:p>
             <a:fld id="{37CC0096-1860-4642-9CD2-0079EA5E7CD1}" type="datetimeFigureOut">
               <a:rPr lang="en-US" smtClean="0"/>
-              <a:t>8/18/2021</a:t>
+              <a:t>12/1/2021</a:t>
             </a:fld>
             <a:endParaRPr lang="en-US"/>
           </a:p>
@@ -3317,7 +3317,7 @@
             <a:fld id="{37CC0096-1860-4642-9CD2-0079EA5E7CD1}" type="datetimeFigureOut">
               <a:rPr lang="en-US" smtClean="0"/>
               <a:pPr/>
-              <a:t>8/18/2021</a:t>
+              <a:t>12/1/2021</a:t>
             </a:fld>
             <a:endParaRPr lang="en-US"/>
           </a:p>
@@ -3815,7 +3815,7 @@
           <a:lstStyle/>
           <a:p>
             <a:r>
-              <a:rPr lang="en-US" sz="5500" b="1" dirty="0">
+              <a:rPr lang="en-US" sz="4000" b="1" dirty="0">
                 <a:solidFill>
                   <a:schemeClr val="tx1">
                     <a:lumMod val="95000"/>
@@ -3829,43 +3829,9 @@
                   </a:outerShdw>
                 </a:effectLst>
               </a:rPr>
-              <a:t>HIP 16: </a:t>
-            </a:r>
-            <a:r>
-              <a:rPr lang="en-US" sz="5500" b="1" dirty="0" smtClean="0">
-                <a:solidFill>
-                  <a:schemeClr val="tx1">
-                    <a:lumMod val="95000"/>
-                  </a:schemeClr>
-                </a:solidFill>
-                <a:effectLst>
-                  <a:outerShdw blurRad="50800" dist="50800" dir="5400000" sx="102000" sy="102000" algn="ctr" rotWithShape="0">
-                    <a:srgbClr val="000000">
-                      <a:alpha val="43137"/>
-                    </a:srgbClr>
-                  </a:outerShdw>
-                </a:effectLst>
-              </a:rPr>
-              <a:t>Reducing BLS </a:t>
-            </a:r>
-            <a:r>
-              <a:rPr lang="en-US" sz="5500" b="1" dirty="0">
-                <a:solidFill>
-                  <a:schemeClr val="tx1">
-                    <a:lumMod val="95000"/>
-                  </a:schemeClr>
-                </a:solidFill>
-                <a:effectLst>
-                  <a:outerShdw blurRad="50800" dist="50800" dir="5400000" sx="102000" sy="102000" algn="ctr" rotWithShape="0">
-                    <a:srgbClr val="000000">
-                      <a:alpha val="43137"/>
-                    </a:srgbClr>
-                  </a:outerShdw>
-                </a:effectLst>
-              </a:rPr>
-              <a:t>keys</a:t>
-            </a:r>
-            <a:endParaRPr sz="5500" b="1" dirty="0">
+              <a:t>HIP-16: Enforce a 6.4% max key per shard limit for each validator</a:t>
+            </a:r>
+            <a:endParaRPr sz="4000" b="1" dirty="0">
               <a:solidFill>
                 <a:schemeClr val="tx1">
                   <a:lumMod val="95000"/>
@@ -3908,7 +3874,7 @@
         </p:spPr>
         <p:txBody>
           <a:bodyPr wrap="square" anchor="ctr" anchorCtr="0">
-            <a:normAutofit fontScale="70000" lnSpcReduction="20000"/>
+            <a:normAutofit fontScale="77500" lnSpcReduction="20000"/>
           </a:bodyPr>
           <a:lstStyle/>
           <a:p>
@@ -3919,66 +3885,7 @@
                   <a:schemeClr val="tx1"/>
                 </a:solidFill>
               </a:rPr>
-              <a:t>Summary : </a:t>
-            </a:r>
-            <a:r>
-              <a:rPr lang="en-US" dirty="0">
-                <a:solidFill>
-                  <a:schemeClr val="tx1"/>
-                </a:solidFill>
-              </a:rPr>
-              <a:t>due to the fact that many validators still extend keys far below median, we are proposing a method to further limit the amount of BLS keys a validator can have</a:t>
-            </a:r>
-            <a:r>
-              <a:rPr lang="en-US" dirty="0" smtClean="0">
-                <a:solidFill>
-                  <a:schemeClr val="tx1"/>
-                </a:solidFill>
-              </a:rPr>
-              <a:t>.</a:t>
-            </a:r>
-          </a:p>
-          <a:p>
-            <a:pPr algn="just"/>
-            <a:endParaRPr lang="en-US" dirty="0" smtClean="0">
-              <a:solidFill>
-                <a:schemeClr val="tx1"/>
-              </a:solidFill>
-            </a:endParaRPr>
-          </a:p>
-          <a:p>
-            <a:pPr algn="just"/>
-            <a:r>
-              <a:rPr lang="en-US" dirty="0" smtClean="0">
-                <a:solidFill>
-                  <a:schemeClr val="tx1"/>
-                </a:solidFill>
-              </a:rPr>
-              <a:t>Background / Motivation </a:t>
-            </a:r>
-            <a:r>
-              <a:rPr lang="en-US" dirty="0">
-                <a:solidFill>
-                  <a:schemeClr val="tx1"/>
-                </a:solidFill>
-              </a:rPr>
-              <a:t>: </a:t>
-            </a:r>
-            <a:r>
-              <a:rPr lang="en-US" dirty="0">
-                <a:solidFill>
-                  <a:schemeClr val="tx1"/>
-                </a:solidFill>
-              </a:rPr>
-              <a:t>The reason we want to do this is because the median stake is high and due to it, many validators bid around it or below it, while there is no incentive to do that since getting below the lower bound is near impossible anymore. The impact of that is that validators with 3-5M stake cannot be safely elected to further secure the network</a:t>
-            </a:r>
-            <a:r>
-              <a:rPr lang="en-US" dirty="0" smtClean="0">
-                <a:solidFill>
-                  <a:schemeClr val="tx1"/>
-                </a:solidFill>
-              </a:rPr>
-              <a:t>.</a:t>
+              <a:t>Summary: This proposal is for adding a max keys per shard limit for each validator.</a:t>
             </a:r>
           </a:p>
           <a:p>
@@ -3992,12 +3899,20 @@
           <a:p>
             <a:pPr algn="just"/>
             <a:r>
+              <a:rPr lang="en-US" dirty="0">
+                <a:solidFill>
+                  <a:schemeClr val="tx1"/>
+                </a:solidFill>
+              </a:rPr>
+              <a:t>Background: Currently a large validator can dominate the voting power of a single shard by assigning all their keys to that shard. </a:t>
+            </a:r>
+            <a:r>
               <a:rPr lang="en-US" dirty="0" smtClean="0">
                 <a:solidFill>
                   <a:schemeClr val="tx1"/>
                 </a:solidFill>
               </a:rPr>
-              <a:t>Specification </a:t>
+              <a:t>If a </a:t>
             </a:r>
             <a:r>
               <a:rPr lang="en-US" dirty="0">
@@ -4005,162 +3920,74 @@
                   <a:schemeClr val="tx1"/>
                 </a:solidFill>
               </a:rPr>
-              <a:t>: This is not a complete proposal as we would like inputs from the core team and other </a:t>
-            </a:r>
+              <a:t>large validator dominates a shard and proceeds to run underpowered nodes they can possibly slow down the block times as we may be currently seeing on shard 0.</a:t>
+            </a:r>
+          </a:p>
+          <a:p>
+            <a:pPr algn="just"/>
+            <a:endParaRPr lang="en-US" dirty="0">
+              <a:solidFill>
+                <a:schemeClr val="tx1"/>
+              </a:solidFill>
+            </a:endParaRPr>
+          </a:p>
+          <a:p>
+            <a:pPr algn="just"/>
             <a:r>
               <a:rPr lang="en-US" dirty="0">
                 <a:solidFill>
                   <a:schemeClr val="tx1"/>
                 </a:solidFill>
               </a:rPr>
-              <a:t>validators on what the best possible solution would be, before we put it up for a vote. </a:t>
-            </a:r>
-          </a:p>
-          <a:p>
-            <a:pPr lvl="1" algn="just"/>
+              <a:t>Motivation: To further decentralize Harmony protocol and prevent scenarios like the above from happening we propose a max keys per shard limit to decrease the likelihood of a shard being taken over by a small group misbehaving </a:t>
+            </a:r>
+            <a:r>
+              <a:rPr lang="en-US" dirty="0" smtClean="0">
+                <a:solidFill>
+                  <a:schemeClr val="tx1"/>
+                </a:solidFill>
+              </a:rPr>
+              <a:t>validators.</a:t>
+            </a:r>
+            <a:endParaRPr lang="en-US" dirty="0">
+              <a:solidFill>
+                <a:schemeClr val="tx1"/>
+              </a:solidFill>
+            </a:endParaRPr>
+          </a:p>
+          <a:p>
+            <a:pPr algn="just"/>
+            <a:endParaRPr lang="en-US" dirty="0">
+              <a:solidFill>
+                <a:schemeClr val="tx1"/>
+              </a:solidFill>
+            </a:endParaRPr>
+          </a:p>
+          <a:p>
+            <a:pPr algn="just"/>
             <a:r>
               <a:rPr lang="en-US" dirty="0">
                 <a:solidFill>
                   <a:schemeClr val="tx1"/>
                 </a:solidFill>
-                <a:latin typeface="+mj-lt"/>
               </a:rPr>
-              <a:t>1. Generally </a:t>
+              <a:t>Specification: Add a 6.4% max keys per shard limit for each validator. </a:t>
+            </a:r>
+            <a:r>
+              <a:rPr lang="en-US" dirty="0" smtClean="0">
+                <a:solidFill>
+                  <a:schemeClr val="tx1"/>
+                </a:solidFill>
+              </a:rPr>
+              <a:t>So </a:t>
             </a:r>
             <a:r>
               <a:rPr lang="en-US" dirty="0">
                 <a:solidFill>
                   <a:schemeClr val="tx1"/>
                 </a:solidFill>
-                <a:latin typeface="+mj-lt"/>
               </a:rPr>
-              <a:t>limit the amount of </a:t>
-            </a:r>
-            <a:r>
-              <a:rPr lang="en-US" dirty="0" err="1">
-                <a:solidFill>
-                  <a:schemeClr val="tx1"/>
-                </a:solidFill>
-                <a:latin typeface="+mj-lt"/>
-              </a:rPr>
-              <a:t>bls</a:t>
-            </a:r>
-            <a:r>
-              <a:rPr lang="en-US" dirty="0">
-                <a:solidFill>
-                  <a:schemeClr val="tx1"/>
-                </a:solidFill>
-                <a:latin typeface="+mj-lt"/>
-              </a:rPr>
-              <a:t> keys (absolute reduction to </a:t>
-            </a:r>
-            <a:r>
-              <a:rPr lang="en-US" dirty="0">
-                <a:solidFill>
-                  <a:schemeClr val="tx1"/>
-                </a:solidFill>
-                <a:latin typeface="+mj-lt"/>
-              </a:rPr>
-              <a:t>e.g. </a:t>
-            </a:r>
-            <a:r>
-              <a:rPr lang="en-US" dirty="0">
-                <a:solidFill>
-                  <a:schemeClr val="tx1"/>
-                </a:solidFill>
-                <a:latin typeface="+mj-lt"/>
-              </a:rPr>
-              <a:t>30 - just an example</a:t>
-            </a:r>
-            <a:r>
-              <a:rPr lang="en-US" dirty="0">
-                <a:solidFill>
-                  <a:schemeClr val="tx1"/>
-                </a:solidFill>
-                <a:latin typeface="+mj-lt"/>
-              </a:rPr>
-              <a:t>)</a:t>
-            </a:r>
-            <a:endParaRPr lang="en-US" dirty="0">
-              <a:solidFill>
-                <a:schemeClr val="tx1"/>
-              </a:solidFill>
-              <a:latin typeface="+mj-lt"/>
-            </a:endParaRPr>
-          </a:p>
-          <a:p>
-            <a:pPr lvl="1" algn="just"/>
-            <a:r>
-              <a:rPr lang="en-US" dirty="0">
-                <a:solidFill>
-                  <a:schemeClr val="tx1"/>
-                </a:solidFill>
-                <a:latin typeface="+mj-lt"/>
-              </a:rPr>
-              <a:t>2. Dynamically </a:t>
-            </a:r>
-            <a:r>
-              <a:rPr lang="en-US" dirty="0">
-                <a:solidFill>
-                  <a:schemeClr val="tx1"/>
-                </a:solidFill>
-                <a:latin typeface="+mj-lt"/>
-              </a:rPr>
-              <a:t>limit amount of </a:t>
-            </a:r>
-            <a:r>
-              <a:rPr lang="en-US" dirty="0" err="1">
-                <a:solidFill>
-                  <a:schemeClr val="tx1"/>
-                </a:solidFill>
-                <a:latin typeface="+mj-lt"/>
-              </a:rPr>
-              <a:t>bls</a:t>
-            </a:r>
-            <a:r>
-              <a:rPr lang="en-US" dirty="0">
-                <a:solidFill>
-                  <a:schemeClr val="tx1"/>
-                </a:solidFill>
-                <a:latin typeface="+mj-lt"/>
-              </a:rPr>
-              <a:t> </a:t>
-            </a:r>
-            <a:r>
-              <a:rPr lang="en-US" dirty="0">
-                <a:solidFill>
-                  <a:schemeClr val="tx1"/>
-                </a:solidFill>
-                <a:latin typeface="+mj-lt"/>
-              </a:rPr>
-              <a:t>keys based </a:t>
-            </a:r>
-            <a:r>
-              <a:rPr lang="en-US" dirty="0">
-                <a:solidFill>
-                  <a:schemeClr val="tx1"/>
-                </a:solidFill>
-                <a:latin typeface="+mj-lt"/>
-              </a:rPr>
-              <a:t>on stake size considering </a:t>
-            </a:r>
-            <a:r>
-              <a:rPr lang="en-US" dirty="0">
-                <a:solidFill>
-                  <a:schemeClr val="tx1"/>
-                </a:solidFill>
-                <a:latin typeface="+mj-lt"/>
-              </a:rPr>
-              <a:t>median / based </a:t>
-            </a:r>
-            <a:r>
-              <a:rPr lang="en-US" dirty="0">
-                <a:solidFill>
-                  <a:schemeClr val="tx1"/>
-                </a:solidFill>
-                <a:latin typeface="+mj-lt"/>
-              </a:rPr>
-              <a:t>on bid size considering median</a:t>
+              <a:t>for 900 slots this would imply a 14 key per shard limit and for 1000 slots this would increase to a 16 key per shard limit. </a:t>
             </a:r>
             <a:endParaRPr dirty="0">
               <a:solidFill>

</xml_diff>

<commit_message>
[UPD] multiple images for 1 tweet support, HIP16/17 -> Vote
</commit_message>
<xml_diff>
--- a/tweet_data/media/HIP/HIP16.pptx
+++ b/tweet_data/media/HIP/HIP16.pptx
@@ -214,7 +214,7 @@
           <a:p>
             <a:fld id="{762B48F5-BACC-47D6-A0F7-82FBF9C6BC85}" type="datetimeFigureOut">
               <a:rPr lang="en-US"/>
-              <a:t>12/1/2021</a:t>
+              <a:t>12/9/2021</a:t>
             </a:fld>
             <a:endParaRPr/>
           </a:p>
@@ -379,7 +379,7 @@
           <a:p>
             <a:fld id="{0CB1CD00-5424-4675-AB18-2C419B060449}" type="datetimeFigureOut">
               <a:rPr lang="en-US"/>
-              <a:t>12/1/2021</a:t>
+              <a:t>12/9/2021</a:t>
             </a:fld>
             <a:endParaRPr/>
           </a:p>
@@ -1016,7 +1016,7 @@
           <a:p>
             <a:fld id="{37CC0096-1860-4642-9CD2-0079EA5E7CD1}" type="datetimeFigureOut">
               <a:rPr lang="en-US" smtClean="0"/>
-              <a:t>12/1/2021</a:t>
+              <a:t>12/9/2021</a:t>
             </a:fld>
             <a:endParaRPr lang="en-US"/>
           </a:p>
@@ -1196,7 +1196,7 @@
           <a:p>
             <a:fld id="{37CC0096-1860-4642-9CD2-0079EA5E7CD1}" type="datetimeFigureOut">
               <a:rPr lang="en-US" smtClean="0"/>
-              <a:t>12/1/2021</a:t>
+              <a:t>12/9/2021</a:t>
             </a:fld>
             <a:endParaRPr lang="en-US"/>
           </a:p>
@@ -1370,7 +1370,7 @@
           <a:p>
             <a:fld id="{37CC0096-1860-4642-9CD2-0079EA5E7CD1}" type="datetimeFigureOut">
               <a:rPr lang="en-US" smtClean="0"/>
-              <a:t>12/1/2021</a:t>
+              <a:t>12/9/2021</a:t>
             </a:fld>
             <a:endParaRPr lang="en-US"/>
           </a:p>
@@ -1805,7 +1805,7 @@
           <a:p>
             <a:fld id="{37CC0096-1860-4642-9CD2-0079EA5E7CD1}" type="datetimeFigureOut">
               <a:rPr lang="en-US" smtClean="0"/>
-              <a:t>12/1/2021</a:t>
+              <a:t>12/9/2021</a:t>
             </a:fld>
             <a:endParaRPr lang="en-US"/>
           </a:p>
@@ -2245,7 +2245,7 @@
           <a:p>
             <a:fld id="{37CC0096-1860-4642-9CD2-0079EA5E7CD1}" type="datetimeFigureOut">
               <a:rPr lang="en-US" smtClean="0"/>
-              <a:t>12/1/2021</a:t>
+              <a:t>12/9/2021</a:t>
             </a:fld>
             <a:endParaRPr lang="en-US"/>
           </a:p>
@@ -2363,7 +2363,7 @@
           <a:p>
             <a:fld id="{37CC0096-1860-4642-9CD2-0079EA5E7CD1}" type="datetimeFigureOut">
               <a:rPr lang="en-US" smtClean="0"/>
-              <a:t>12/1/2021</a:t>
+              <a:t>12/9/2021</a:t>
             </a:fld>
             <a:endParaRPr lang="en-US"/>
           </a:p>
@@ -2458,7 +2458,7 @@
           <a:p>
             <a:fld id="{37CC0096-1860-4642-9CD2-0079EA5E7CD1}" type="datetimeFigureOut">
               <a:rPr lang="en-US" smtClean="0"/>
-              <a:t>12/1/2021</a:t>
+              <a:t>12/9/2021</a:t>
             </a:fld>
             <a:endParaRPr lang="en-US"/>
           </a:p>
@@ -2742,7 +2742,7 @@
           <a:p>
             <a:fld id="{37CC0096-1860-4642-9CD2-0079EA5E7CD1}" type="datetimeFigureOut">
               <a:rPr lang="en-US" smtClean="0"/>
-              <a:t>12/1/2021</a:t>
+              <a:t>12/9/2021</a:t>
             </a:fld>
             <a:endParaRPr lang="en-US"/>
           </a:p>
@@ -3055,7 +3055,7 @@
           <a:p>
             <a:fld id="{37CC0096-1860-4642-9CD2-0079EA5E7CD1}" type="datetimeFigureOut">
               <a:rPr lang="en-US" smtClean="0"/>
-              <a:t>12/1/2021</a:t>
+              <a:t>12/9/2021</a:t>
             </a:fld>
             <a:endParaRPr lang="en-US"/>
           </a:p>
@@ -3317,7 +3317,7 @@
             <a:fld id="{37CC0096-1860-4642-9CD2-0079EA5E7CD1}" type="datetimeFigureOut">
               <a:rPr lang="en-US" smtClean="0"/>
               <a:pPr/>
-              <a:t>12/1/2021</a:t>
+              <a:t>12/9/2021</a:t>
             </a:fld>
             <a:endParaRPr lang="en-US"/>
           </a:p>
@@ -4091,7 +4091,7 @@
                   </a:innerShdw>
                 </a:effectLst>
               </a:rPr>
-              <a:t>HIP-16</a:t>
+              <a:t>V-Dao Vote</a:t>
             </a:r>
             <a:endParaRPr lang="en-US" sz="13000" b="1" dirty="0">
               <a:ln w="12700">
@@ -4142,7 +4142,7 @@
           <a:p>
             <a:pPr algn="ctr"/>
             <a:r>
-              <a:rPr lang="en-US" sz="5400" b="1" dirty="0">
+              <a:rPr lang="en-US" sz="5400" b="1" smtClean="0">
                 <a:ln w="12700">
                   <a:noFill/>
                   <a:prstDash val="solid"/>
@@ -4164,8 +4164,30 @@
                   </a:innerShdw>
                 </a:effectLst>
               </a:rPr>
-              <a:t>talk.harmony.one</a:t>
-            </a:r>
+              <a:t>gov.harmony.one</a:t>
+            </a:r>
+            <a:endParaRPr lang="en-US" sz="5400" b="1" dirty="0">
+              <a:ln w="12700">
+                <a:noFill/>
+                <a:prstDash val="solid"/>
+              </a:ln>
+              <a:solidFill>
+                <a:schemeClr val="bg1"/>
+              </a:solidFill>
+              <a:effectLst>
+                <a:glow rad="203200">
+                  <a:schemeClr val="tx1">
+                    <a:alpha val="68000"/>
+                  </a:schemeClr>
+                </a:glow>
+                <a:innerShdw blurRad="63500" dir="4440000">
+                  <a:schemeClr val="tx2">
+                    <a:lumMod val="50000"/>
+                    <a:alpha val="50000"/>
+                  </a:schemeClr>
+                </a:innerShdw>
+              </a:effectLst>
+            </a:endParaRPr>
           </a:p>
         </p:txBody>
       </p:sp>

</xml_diff>